<commit_message>
fix bug in return value...
</commit_message>
<xml_diff>
--- a/classes/prog2015/Lab5.pptx
+++ b/classes/prog2015/Lab5.pptx
@@ -291,7 +291,7 @@
             <a:fld id="{1D8BD707-D9CF-40AE-B4C6-C98DA3205C09}" type="datetimeFigureOut">
               <a:rPr lang="en-US" smtClean="0"/>
               <a:pPr/>
-              <a:t>9/22/2015</a:t>
+              <a:t>10/6/2015</a:t>
             </a:fld>
             <a:endParaRPr lang="en-US"/>
           </a:p>
@@ -458,7 +458,7 @@
             <a:fld id="{1D8BD707-D9CF-40AE-B4C6-C98DA3205C09}" type="datetimeFigureOut">
               <a:rPr lang="en-US" smtClean="0"/>
               <a:pPr/>
-              <a:t>9/22/2015</a:t>
+              <a:t>10/6/2015</a:t>
             </a:fld>
             <a:endParaRPr lang="en-US"/>
           </a:p>
@@ -635,7 +635,7 @@
             <a:fld id="{1D8BD707-D9CF-40AE-B4C6-C98DA3205C09}" type="datetimeFigureOut">
               <a:rPr lang="en-US" smtClean="0"/>
               <a:pPr/>
-              <a:t>9/22/2015</a:t>
+              <a:t>10/6/2015</a:t>
             </a:fld>
             <a:endParaRPr lang="en-US"/>
           </a:p>
@@ -802,7 +802,7 @@
             <a:fld id="{1D8BD707-D9CF-40AE-B4C6-C98DA3205C09}" type="datetimeFigureOut">
               <a:rPr lang="en-US" smtClean="0"/>
               <a:pPr/>
-              <a:t>9/22/2015</a:t>
+              <a:t>10/6/2015</a:t>
             </a:fld>
             <a:endParaRPr lang="en-US"/>
           </a:p>
@@ -1045,7 +1045,7 @@
             <a:fld id="{1D8BD707-D9CF-40AE-B4C6-C98DA3205C09}" type="datetimeFigureOut">
               <a:rPr lang="en-US" smtClean="0"/>
               <a:pPr/>
-              <a:t>9/22/2015</a:t>
+              <a:t>10/6/2015</a:t>
             </a:fld>
             <a:endParaRPr lang="en-US"/>
           </a:p>
@@ -1330,7 +1330,7 @@
             <a:fld id="{1D8BD707-D9CF-40AE-B4C6-C98DA3205C09}" type="datetimeFigureOut">
               <a:rPr lang="en-US" smtClean="0"/>
               <a:pPr/>
-              <a:t>9/22/2015</a:t>
+              <a:t>10/6/2015</a:t>
             </a:fld>
             <a:endParaRPr lang="en-US"/>
           </a:p>
@@ -1749,7 +1749,7 @@
             <a:fld id="{1D8BD707-D9CF-40AE-B4C6-C98DA3205C09}" type="datetimeFigureOut">
               <a:rPr lang="en-US" smtClean="0"/>
               <a:pPr/>
-              <a:t>9/22/2015</a:t>
+              <a:t>10/6/2015</a:t>
             </a:fld>
             <a:endParaRPr lang="en-US"/>
           </a:p>
@@ -1864,7 +1864,7 @@
             <a:fld id="{1D8BD707-D9CF-40AE-B4C6-C98DA3205C09}" type="datetimeFigureOut">
               <a:rPr lang="en-US" smtClean="0"/>
               <a:pPr/>
-              <a:t>9/22/2015</a:t>
+              <a:t>10/6/2015</a:t>
             </a:fld>
             <a:endParaRPr lang="en-US"/>
           </a:p>
@@ -1956,7 +1956,7 @@
             <a:fld id="{1D8BD707-D9CF-40AE-B4C6-C98DA3205C09}" type="datetimeFigureOut">
               <a:rPr lang="en-US" smtClean="0"/>
               <a:pPr/>
-              <a:t>9/22/2015</a:t>
+              <a:t>10/6/2015</a:t>
             </a:fld>
             <a:endParaRPr lang="en-US"/>
           </a:p>
@@ -2230,7 +2230,7 @@
             <a:fld id="{1D8BD707-D9CF-40AE-B4C6-C98DA3205C09}" type="datetimeFigureOut">
               <a:rPr lang="en-US" smtClean="0"/>
               <a:pPr/>
-              <a:t>9/22/2015</a:t>
+              <a:t>10/6/2015</a:t>
             </a:fld>
             <a:endParaRPr lang="en-US"/>
           </a:p>
@@ -2480,7 +2480,7 @@
             <a:fld id="{1D8BD707-D9CF-40AE-B4C6-C98DA3205C09}" type="datetimeFigureOut">
               <a:rPr lang="en-US" smtClean="0"/>
               <a:pPr/>
-              <a:t>9/22/2015</a:t>
+              <a:t>10/6/2015</a:t>
             </a:fld>
             <a:endParaRPr lang="en-US"/>
           </a:p>
@@ -2690,7 +2690,7 @@
             <a:fld id="{1D8BD707-D9CF-40AE-B4C6-C98DA3205C09}" type="datetimeFigureOut">
               <a:rPr lang="en-US" smtClean="0"/>
               <a:pPr/>
-              <a:t>9/22/2015</a:t>
+              <a:t>10/6/2015</a:t>
             </a:fld>
             <a:endParaRPr lang="en-US"/>
           </a:p>
@@ -3266,7 +3266,6 @@
               <a:rPr lang="en-US" dirty="0" smtClean="0"/>
               <a:t>For Lab #5:</a:t>
             </a:r>
-            <a:endParaRPr lang="en-US" dirty="0" smtClean="0"/>
           </a:p>
           <a:p>
             <a:r>
@@ -3302,7 +3301,19 @@
           <a:p>
             <a:r>
               <a:rPr lang="en-US" dirty="0" smtClean="0"/>
-              <a:t>public static List&lt;String&gt; </a:t>
+              <a:t>public static </a:t>
+            </a:r>
+            <a:r>
+              <a:rPr lang="en-US" dirty="0" smtClean="0"/>
+              <a:t>List&lt;</a:t>
+            </a:r>
+            <a:r>
+              <a:rPr lang="en-US" dirty="0" err="1" smtClean="0"/>
+              <a:t>FastaSequence</a:t>
+            </a:r>
+            <a:r>
+              <a:rPr lang="en-US" dirty="0" smtClean="0"/>
+              <a:t>&gt; </a:t>
             </a:r>
             <a:r>
               <a:rPr lang="en-US" dirty="0" err="1" smtClean="0"/>
@@ -3350,13 +3361,8 @@
           <a:p>
             <a:r>
               <a:rPr lang="en-US" dirty="0" smtClean="0"/>
-              <a:t>	</a:t>
-            </a:r>
-            <a:r>
-              <a:rPr lang="en-US" dirty="0" smtClean="0"/>
-              <a:t>// returns the header of this sequence without the “&gt;”</a:t>
-            </a:r>
-            <a:endParaRPr lang="en-US" dirty="0" smtClean="0"/>
+              <a:t>	// returns the header of this sequence without the “&gt;”</a:t>
+            </a:r>
           </a:p>
           <a:p>
             <a:r>
@@ -3375,11 +3381,7 @@
           <a:p>
             <a:r>
               <a:rPr lang="en-US" dirty="0" smtClean="0"/>
-              <a:t>	</a:t>
-            </a:r>
-            <a:r>
-              <a:rPr lang="en-US" dirty="0" smtClean="0"/>
-              <a:t>{	… }</a:t>
+              <a:t>	{	… }</a:t>
             </a:r>
           </a:p>
           <a:p>
@@ -3388,11 +3390,7 @@
           <a:p>
             <a:r>
               <a:rPr lang="en-US" dirty="0" smtClean="0"/>
-              <a:t>	</a:t>
-            </a:r>
-            <a:r>
-              <a:rPr lang="en-US" dirty="0" smtClean="0"/>
-              <a:t>// returns the </a:t>
+              <a:t>	// returns the </a:t>
             </a:r>
             <a:r>
               <a:rPr lang="en-US" dirty="0" err="1" smtClean="0"/>
@@ -3411,11 +3409,7 @@
           <a:p>
             <a:r>
               <a:rPr lang="en-US" dirty="0" smtClean="0"/>
-              <a:t>	</a:t>
-            </a:r>
-            <a:r>
-              <a:rPr lang="en-US" dirty="0" smtClean="0"/>
-              <a:t>public String </a:t>
+              <a:t>	public String </a:t>
             </a:r>
             <a:r>
               <a:rPr lang="en-US" dirty="0" err="1" smtClean="0"/>
@@ -3429,38 +3423,25 @@
           <a:p>
             <a:r>
               <a:rPr lang="en-US" dirty="0" smtClean="0"/>
+              <a:t>	{  …}</a:t>
+            </a:r>
+          </a:p>
+          <a:p>
+            <a:r>
+              <a:rPr lang="en-US" dirty="0" smtClean="0"/>
               <a:t>	</a:t>
             </a:r>
-            <a:r>
-              <a:rPr lang="en-US" dirty="0" smtClean="0"/>
-              <a:t>{  …}</a:t>
-            </a:r>
-            <a:endParaRPr lang="en-US" dirty="0" smtClean="0"/>
-          </a:p>
-          <a:p>
-            <a:r>
-              <a:rPr lang="en-US" dirty="0" smtClean="0"/>
-              <a:t>	</a:t>
-            </a:r>
-          </a:p>
-          <a:p>
-            <a:r>
-              <a:rPr lang="en-US" dirty="0" smtClean="0"/>
-              <a:t>	</a:t>
-            </a:r>
-            <a:r>
-              <a:rPr lang="en-US" dirty="0" smtClean="0"/>
-              <a:t>// returns the number of G’s and C’s divided by the length of this sequence</a:t>
-            </a:r>
-          </a:p>
-          <a:p>
-            <a:r>
-              <a:rPr lang="en-US" dirty="0" smtClean="0"/>
-              <a:t>	</a:t>
-            </a:r>
-            <a:r>
-              <a:rPr lang="en-US" dirty="0" smtClean="0"/>
-              <a:t>public float </a:t>
+          </a:p>
+          <a:p>
+            <a:r>
+              <a:rPr lang="en-US" dirty="0" smtClean="0"/>
+              <a:t>	// returns the number of G’s and C’s divided by the length of this sequence</a:t>
+            </a:r>
+          </a:p>
+          <a:p>
+            <a:r>
+              <a:rPr lang="en-US" dirty="0" smtClean="0"/>
+              <a:t>	public float </a:t>
             </a:r>
             <a:r>
               <a:rPr lang="en-US" dirty="0" err="1" smtClean="0"/>
@@ -3474,11 +3455,7 @@
           <a:p>
             <a:r>
               <a:rPr lang="en-US" dirty="0" smtClean="0"/>
-              <a:t>	</a:t>
-            </a:r>
-            <a:r>
-              <a:rPr lang="en-US" dirty="0" smtClean="0"/>
-              <a:t>{ … }</a:t>
+              <a:t>	{ … }</a:t>
             </a:r>
             <a:endParaRPr lang="en-US" dirty="0"/>
           </a:p>
@@ -3812,11 +3789,7 @@
           <a:p>
             <a:r>
               <a:rPr lang="en-US" dirty="0" smtClean="0"/>
-              <a:t>Please e-mail or check in with notifications to afodor@uncc.edu and </a:t>
-            </a:r>
-            <a:r>
-              <a:rPr lang="en-US" dirty="0" smtClean="0"/>
-              <a:t>rlinchan@uncc.edu</a:t>
+              <a:t>Please e-mail or check in with notifications to afodor@uncc.edu and rlinchan@uncc.edu</a:t>
             </a:r>
             <a:endParaRPr lang="en-US" dirty="0"/>
           </a:p>

</xml_diff>